<commit_message>
attempting to add a slideshow and failing
</commit_message>
<xml_diff>
--- a/static/backgrounds.pptx
+++ b/static/backgrounds.pptx
@@ -202,7 +202,7 @@
           <a:p>
             <a:fld id="{F47D3ADA-58CA-3749-ACA4-AA8CF7BFBFDC}" type="datetimeFigureOut">
               <a:rPr lang="en-US" smtClean="0"/>
-              <a:t>5/15/20</a:t>
+              <a:t>5/16/20</a:t>
             </a:fld>
             <a:endParaRPr lang="en-US"/>
           </a:p>
@@ -883,7 +883,7 @@
           <a:p>
             <a:fld id="{45EA351F-D686-8D46-9B8F-D2F97EDD889B}" type="datetimeFigureOut">
               <a:rPr lang="en-US" smtClean="0"/>
-              <a:t>5/15/20</a:t>
+              <a:t>5/16/20</a:t>
             </a:fld>
             <a:endParaRPr lang="en-US"/>
           </a:p>
@@ -1081,7 +1081,7 @@
           <a:p>
             <a:fld id="{45EA351F-D686-8D46-9B8F-D2F97EDD889B}" type="datetimeFigureOut">
               <a:rPr lang="en-US" smtClean="0"/>
-              <a:t>5/15/20</a:t>
+              <a:t>5/16/20</a:t>
             </a:fld>
             <a:endParaRPr lang="en-US"/>
           </a:p>
@@ -1289,7 +1289,7 @@
           <a:p>
             <a:fld id="{45EA351F-D686-8D46-9B8F-D2F97EDD889B}" type="datetimeFigureOut">
               <a:rPr lang="en-US" smtClean="0"/>
-              <a:t>5/15/20</a:t>
+              <a:t>5/16/20</a:t>
             </a:fld>
             <a:endParaRPr lang="en-US"/>
           </a:p>
@@ -1487,7 +1487,7 @@
           <a:p>
             <a:fld id="{45EA351F-D686-8D46-9B8F-D2F97EDD889B}" type="datetimeFigureOut">
               <a:rPr lang="en-US" smtClean="0"/>
-              <a:t>5/15/20</a:t>
+              <a:t>5/16/20</a:t>
             </a:fld>
             <a:endParaRPr lang="en-US"/>
           </a:p>
@@ -1762,7 +1762,7 @@
           <a:p>
             <a:fld id="{45EA351F-D686-8D46-9B8F-D2F97EDD889B}" type="datetimeFigureOut">
               <a:rPr lang="en-US" smtClean="0"/>
-              <a:t>5/15/20</a:t>
+              <a:t>5/16/20</a:t>
             </a:fld>
             <a:endParaRPr lang="en-US"/>
           </a:p>
@@ -2027,7 +2027,7 @@
           <a:p>
             <a:fld id="{45EA351F-D686-8D46-9B8F-D2F97EDD889B}" type="datetimeFigureOut">
               <a:rPr lang="en-US" smtClean="0"/>
-              <a:t>5/15/20</a:t>
+              <a:t>5/16/20</a:t>
             </a:fld>
             <a:endParaRPr lang="en-US"/>
           </a:p>
@@ -2439,7 +2439,7 @@
           <a:p>
             <a:fld id="{45EA351F-D686-8D46-9B8F-D2F97EDD889B}" type="datetimeFigureOut">
               <a:rPr lang="en-US" smtClean="0"/>
-              <a:t>5/15/20</a:t>
+              <a:t>5/16/20</a:t>
             </a:fld>
             <a:endParaRPr lang="en-US"/>
           </a:p>
@@ -2580,7 +2580,7 @@
           <a:p>
             <a:fld id="{45EA351F-D686-8D46-9B8F-D2F97EDD889B}" type="datetimeFigureOut">
               <a:rPr lang="en-US" smtClean="0"/>
-              <a:t>5/15/20</a:t>
+              <a:t>5/16/20</a:t>
             </a:fld>
             <a:endParaRPr lang="en-US"/>
           </a:p>
@@ -2693,7 +2693,7 @@
           <a:p>
             <a:fld id="{45EA351F-D686-8D46-9B8F-D2F97EDD889B}" type="datetimeFigureOut">
               <a:rPr lang="en-US" smtClean="0"/>
-              <a:t>5/15/20</a:t>
+              <a:t>5/16/20</a:t>
             </a:fld>
             <a:endParaRPr lang="en-US"/>
           </a:p>
@@ -3004,7 +3004,7 @@
           <a:p>
             <a:fld id="{45EA351F-D686-8D46-9B8F-D2F97EDD889B}" type="datetimeFigureOut">
               <a:rPr lang="en-US" smtClean="0"/>
-              <a:t>5/15/20</a:t>
+              <a:t>5/16/20</a:t>
             </a:fld>
             <a:endParaRPr lang="en-US"/>
           </a:p>
@@ -3292,7 +3292,7 @@
           <a:p>
             <a:fld id="{45EA351F-D686-8D46-9B8F-D2F97EDD889B}" type="datetimeFigureOut">
               <a:rPr lang="en-US" smtClean="0"/>
-              <a:t>5/15/20</a:t>
+              <a:t>5/16/20</a:t>
             </a:fld>
             <a:endParaRPr lang="en-US"/>
           </a:p>
@@ -3533,7 +3533,7 @@
           <a:p>
             <a:fld id="{45EA351F-D686-8D46-9B8F-D2F97EDD889B}" type="datetimeFigureOut">
               <a:rPr lang="en-US" smtClean="0"/>
-              <a:t>5/15/20</a:t>
+              <a:t>5/16/20</a:t>
             </a:fld>
             <a:endParaRPr lang="en-US"/>
           </a:p>
@@ -6998,6 +6998,58 @@
           <a:chExt cx="0" cy="0"/>
         </a:xfrm>
       </p:grpSpPr>
+      <p:pic>
+        <p:nvPicPr>
+          <p:cNvPr id="3" name="Picture 2" descr="A picture containing drawing&#10;&#10;Description automatically generated">
+            <a:extLst>
+              <a:ext uri="{FF2B5EF4-FFF2-40B4-BE49-F238E27FC236}">
+                <a16:creationId xmlns:a16="http://schemas.microsoft.com/office/drawing/2014/main" id="{186FF710-5463-1448-8D18-5022D1B903C8}"/>
+              </a:ext>
+            </a:extLst>
+          </p:cNvPr>
+          <p:cNvPicPr>
+            <a:picLocks noChangeAspect="1"/>
+          </p:cNvPicPr>
+          <p:nvPr/>
+        </p:nvPicPr>
+        <p:blipFill>
+          <a:blip r:embed="rId2">
+            <a:extLst>
+              <a:ext uri="{BEBA8EAE-BF5A-486C-A8C5-ECC9F3942E4B}">
+                <a14:imgProps xmlns:a14="http://schemas.microsoft.com/office/drawing/2010/main">
+                  <a14:imgLayer r:embed="rId3">
+                    <a14:imgEffect>
+                      <a14:backgroundRemoval t="10000" b="93191" l="937" r="96566">
+                        <a14:foregroundMark x1="10770" y1="36170" x2="10770" y2="36170"/>
+                        <a14:foregroundMark x1="5099" y1="44255" x2="5099" y2="44255"/>
+                        <a14:foregroundMark x1="937" y1="61915" x2="937" y2="61915"/>
+                        <a14:foregroundMark x1="40166" y1="93617" x2="40166" y2="93617"/>
+                        <a14:foregroundMark x1="65765" y1="65745" x2="65765" y2="65745"/>
+                        <a14:foregroundMark x1="69303" y1="20000" x2="69303" y2="20000"/>
+                        <a14:foregroundMark x1="72737" y1="43191" x2="72737" y2="43191"/>
+                        <a14:foregroundMark x1="92352" y1="54894" x2="92352" y2="54894"/>
+                        <a14:foregroundMark x1="96566" y1="52340" x2="96566" y2="52340"/>
+                      </a14:backgroundRemoval>
+                    </a14:imgEffect>
+                  </a14:imgLayer>
+                </a14:imgProps>
+              </a:ext>
+            </a:extLst>
+          </a:blip>
+          <a:stretch>
+            <a:fillRect/>
+          </a:stretch>
+        </p:blipFill>
+        <p:spPr>
+          <a:xfrm>
+            <a:off x="0" y="1938303"/>
+            <a:ext cx="12192000" cy="2981394"/>
+          </a:xfrm>
+          <a:prstGeom prst="rect">
+            <a:avLst/>
+          </a:prstGeom>
+        </p:spPr>
+      </p:pic>
     </p:spTree>
     <p:extLst>
       <p:ext uri="{BB962C8B-B14F-4D97-AF65-F5344CB8AC3E}">

</xml_diff>